<commit_message>
results for s2 1d
</commit_message>
<xml_diff>
--- a/6-month-milestone/evaluation/scenario_2/ta_1/funman/FUNMAN_results.pptx
+++ b/6-month-milestone/evaluation/scenario_2/ta_1/funman/FUNMAN_results.pptx
@@ -6,6 +6,7 @@
   </p:sldMasterIdLst>
   <p:sldIdLst>
     <p:sldId id="256" r:id="rId2"/>
+    <p:sldId id="257" r:id="rId3"/>
   </p:sldIdLst>
   <p:sldSz cx="12192000" cy="6858000"/>
   <p:notesSz cx="6858000" cy="9144000"/>
@@ -104,6 +105,11 @@
       </a:defRPr>
     </a:lvl9pPr>
   </p:defaultTextStyle>
+  <p:extLst>
+    <p:ext uri="{EFAFB233-063F-42B5-8137-9DF3F51BA10A}">
+      <p15:sldGuideLst xmlns:p15="http://schemas.microsoft.com/office/powerpoint/2012/main"/>
+    </p:ext>
+  </p:extLst>
 </p:presentation>
 </file>
 
@@ -4697,6 +4703,985 @@
 </p:sld>
 </file>
 
+<file path=ppt/slides/slide2.xml><?xml version="1.0" encoding="utf-8"?>
+<p:sld xmlns:a="http://schemas.openxmlformats.org/drawingml/2006/main" xmlns:r="http://schemas.openxmlformats.org/officeDocument/2006/relationships" xmlns:p="http://schemas.openxmlformats.org/presentationml/2006/main">
+  <p:cSld>
+    <p:spTree>
+      <p:nvGrpSpPr>
+        <p:cNvPr id="1" name=""/>
+        <p:cNvGrpSpPr/>
+        <p:nvPr/>
+      </p:nvGrpSpPr>
+      <p:grpSpPr>
+        <a:xfrm>
+          <a:off x="0" y="0"/>
+          <a:ext cx="0" cy="0"/>
+          <a:chOff x="0" y="0"/>
+          <a:chExt cx="0" cy="0"/>
+        </a:xfrm>
+      </p:grpSpPr>
+      <p:pic>
+        <p:nvPicPr>
+          <p:cNvPr id="34" name="Picture 33">
+            <a:extLst>
+              <a:ext uri="{FF2B5EF4-FFF2-40B4-BE49-F238E27FC236}">
+                <a16:creationId xmlns:a16="http://schemas.microsoft.com/office/drawing/2014/main" id="{FB67E216-A1EC-3EF4-2A5F-85340E89FA31}"/>
+              </a:ext>
+            </a:extLst>
+          </p:cNvPr>
+          <p:cNvPicPr>
+            <a:picLocks noChangeAspect="1"/>
+          </p:cNvPicPr>
+          <p:nvPr/>
+        </p:nvPicPr>
+        <p:blipFill>
+          <a:blip r:embed="rId2"/>
+          <a:stretch>
+            <a:fillRect/>
+          </a:stretch>
+        </p:blipFill>
+        <p:spPr>
+          <a:xfrm>
+            <a:off x="5818170" y="3808379"/>
+            <a:ext cx="3991819" cy="2993864"/>
+          </a:xfrm>
+          <a:prstGeom prst="rect">
+            <a:avLst/>
+          </a:prstGeom>
+        </p:spPr>
+      </p:pic>
+      <p:sp>
+        <p:nvSpPr>
+          <p:cNvPr id="4" name="Title 3">
+            <a:extLst>
+              <a:ext uri="{FF2B5EF4-FFF2-40B4-BE49-F238E27FC236}">
+                <a16:creationId xmlns:a16="http://schemas.microsoft.com/office/drawing/2014/main" id="{A0851BA8-B5E1-92B7-2544-13B554F97DF4}"/>
+              </a:ext>
+            </a:extLst>
+          </p:cNvPr>
+          <p:cNvSpPr>
+            <a:spLocks noGrp="1"/>
+          </p:cNvSpPr>
+          <p:nvPr>
+            <p:ph type="title"/>
+          </p:nvPr>
+        </p:nvSpPr>
+        <p:spPr/>
+        <p:txBody>
+          <a:bodyPr/>
+          <a:lstStyle/>
+          <a:p>
+            <a:r>
+              <a:rPr lang="en-US" dirty="0"/>
+              <a:t>S2.1.d: Synthesize 𝜀 and 𝜃 with </a:t>
+            </a:r>
+            <a:r>
+              <a:rPr lang="en-US" dirty="0" err="1"/>
+              <a:t>FunMAn</a:t>
+            </a:r>
+            <a:endParaRPr lang="en-US" dirty="0"/>
+          </a:p>
+        </p:txBody>
+      </p:sp>
+      <p:pic>
+        <p:nvPicPr>
+          <p:cNvPr id="5" name="Picture 4">
+            <a:extLst>
+              <a:ext uri="{FF2B5EF4-FFF2-40B4-BE49-F238E27FC236}">
+                <a16:creationId xmlns:a16="http://schemas.microsoft.com/office/drawing/2014/main" id="{A22E5E41-92B6-C89A-54B3-DB6B3D34FE4E}"/>
+              </a:ext>
+            </a:extLst>
+          </p:cNvPr>
+          <p:cNvPicPr>
+            <a:picLocks noChangeAspect="1"/>
+          </p:cNvPicPr>
+          <p:nvPr/>
+        </p:nvPicPr>
+        <p:blipFill>
+          <a:blip r:embed="rId3"/>
+          <a:stretch>
+            <a:fillRect/>
+          </a:stretch>
+        </p:blipFill>
+        <p:spPr>
+          <a:xfrm>
+            <a:off x="7605347" y="-9265"/>
+            <a:ext cx="4595710" cy="558694"/>
+          </a:xfrm>
+          <a:prstGeom prst="rect">
+            <a:avLst/>
+          </a:prstGeom>
+        </p:spPr>
+      </p:pic>
+      <p:sp>
+        <p:nvSpPr>
+          <p:cNvPr id="7" name="TextBox 6">
+            <a:extLst>
+              <a:ext uri="{FF2B5EF4-FFF2-40B4-BE49-F238E27FC236}">
+                <a16:creationId xmlns:a16="http://schemas.microsoft.com/office/drawing/2014/main" id="{DA2877AC-0900-F29F-99FC-5F42E947ADB4}"/>
+              </a:ext>
+            </a:extLst>
+          </p:cNvPr>
+          <p:cNvSpPr txBox="1"/>
+          <p:nvPr/>
+        </p:nvSpPr>
+        <p:spPr>
+          <a:xfrm>
+            <a:off x="461618" y="1400832"/>
+            <a:ext cx="7257112" cy="646331"/>
+          </a:xfrm>
+          <a:prstGeom prst="rect">
+            <a:avLst/>
+          </a:prstGeom>
+        </p:spPr>
+        <p:style>
+          <a:lnRef idx="1">
+            <a:schemeClr val="accent6"/>
+          </a:lnRef>
+          <a:fillRef idx="2">
+            <a:schemeClr val="accent6"/>
+          </a:fillRef>
+          <a:effectRef idx="1">
+            <a:schemeClr val="accent6"/>
+          </a:effectRef>
+          <a:fontRef idx="minor">
+            <a:schemeClr val="dk1"/>
+          </a:fontRef>
+        </p:style>
+        <p:txBody>
+          <a:bodyPr wrap="square">
+            <a:spAutoFit/>
+          </a:bodyPr>
+          <a:lstStyle/>
+          <a:p>
+            <a:r>
+              <a:rPr lang="en-US" sz="1800" dirty="0">
+                <a:effectLst/>
+                <a:latin typeface="Calibri" panose="020F0502020204030204" pitchFamily="34" charset="0"/>
+              </a:rPr>
+              <a:t>Increase the detection parameters </a:t>
+            </a:r>
+            <a:r>
+              <a:rPr lang="en-US" sz="1800" dirty="0">
+                <a:effectLst/>
+                <a:latin typeface="CambriaMath"/>
+              </a:rPr>
+              <a:t>𝜀 </a:t>
+            </a:r>
+            <a:r>
+              <a:rPr lang="en-US" sz="1800" dirty="0">
+                <a:effectLst/>
+                <a:latin typeface="Calibri" panose="020F0502020204030204" pitchFamily="34" charset="0"/>
+              </a:rPr>
+              <a:t>and </a:t>
+            </a:r>
+            <a:r>
+              <a:rPr lang="en-US" sz="1800" dirty="0">
+                <a:effectLst/>
+                <a:latin typeface="CambriaMath"/>
+              </a:rPr>
+              <a:t>𝜃, and </a:t>
+            </a:r>
+            <a:r>
+              <a:rPr lang="en-US" sz="1800" dirty="0">
+                <a:effectLst/>
+                <a:latin typeface="Calibri" panose="020F0502020204030204" pitchFamily="34" charset="0"/>
+              </a:rPr>
+              <a:t>assume that </a:t>
+            </a:r>
+            <a:r>
+              <a:rPr lang="en-US" sz="1800" dirty="0">
+                <a:effectLst/>
+                <a:latin typeface="CambriaMath"/>
+              </a:rPr>
+              <a:t>𝜃 </a:t>
+            </a:r>
+            <a:r>
+              <a:rPr lang="en-US" sz="1800" dirty="0">
+                <a:effectLst/>
+                <a:latin typeface="Calibri" panose="020F0502020204030204" pitchFamily="34" charset="0"/>
+              </a:rPr>
+              <a:t>&gt;= 2* </a:t>
+            </a:r>
+            <a:r>
+              <a:rPr lang="en-US" sz="1800" dirty="0">
+                <a:effectLst/>
+                <a:latin typeface="CambriaMath"/>
+              </a:rPr>
+              <a:t>𝜀</a:t>
+            </a:r>
+            <a:r>
+              <a:rPr lang="en-US" sz="1800" dirty="0">
+                <a:effectLst/>
+                <a:latin typeface="Calibri" panose="020F0502020204030204" pitchFamily="34" charset="0"/>
+              </a:rPr>
+              <a:t>.  </a:t>
+            </a:r>
+          </a:p>
+          <a:p>
+            <a:r>
+              <a:rPr lang="en-US" sz="1800" dirty="0">
+                <a:effectLst/>
+                <a:latin typeface="Calibri" panose="020F0502020204030204" pitchFamily="34" charset="0"/>
+              </a:rPr>
+              <a:t>Find minimum values to ensure sum(IDART) &lt; 1/3 of the total population? </a:t>
+            </a:r>
+            <a:endParaRPr lang="en-US" dirty="0"/>
+          </a:p>
+        </p:txBody>
+      </p:sp>
+      <p:pic>
+        <p:nvPicPr>
+          <p:cNvPr id="8" name="Picture 7">
+            <a:extLst>
+              <a:ext uri="{FF2B5EF4-FFF2-40B4-BE49-F238E27FC236}">
+                <a16:creationId xmlns:a16="http://schemas.microsoft.com/office/drawing/2014/main" id="{8D20A2FD-0991-61C8-6CF7-BC3F79A4BC5F}"/>
+              </a:ext>
+            </a:extLst>
+          </p:cNvPr>
+          <p:cNvPicPr>
+            <a:picLocks noChangeAspect="1"/>
+          </p:cNvPicPr>
+          <p:nvPr/>
+        </p:nvPicPr>
+        <p:blipFill>
+          <a:blip r:embed="rId4"/>
+          <a:stretch>
+            <a:fillRect/>
+          </a:stretch>
+        </p:blipFill>
+        <p:spPr>
+          <a:xfrm>
+            <a:off x="464488" y="2911680"/>
+            <a:ext cx="5814391" cy="814015"/>
+          </a:xfrm>
+          <a:prstGeom prst="rect">
+            <a:avLst/>
+          </a:prstGeom>
+        </p:spPr>
+      </p:pic>
+      <p:sp>
+        <p:nvSpPr>
+          <p:cNvPr id="9" name="TextBox 8">
+            <a:extLst>
+              <a:ext uri="{FF2B5EF4-FFF2-40B4-BE49-F238E27FC236}">
+                <a16:creationId xmlns:a16="http://schemas.microsoft.com/office/drawing/2014/main" id="{292A810E-7DDB-A8E9-BC54-C233B2BE2374}"/>
+              </a:ext>
+            </a:extLst>
+          </p:cNvPr>
+          <p:cNvSpPr txBox="1"/>
+          <p:nvPr/>
+        </p:nvSpPr>
+        <p:spPr>
+          <a:xfrm>
+            <a:off x="464488" y="2495289"/>
+            <a:ext cx="1798954" cy="369332"/>
+          </a:xfrm>
+          <a:prstGeom prst="rect">
+            <a:avLst/>
+          </a:prstGeom>
+          <a:noFill/>
+        </p:spPr>
+        <p:txBody>
+          <a:bodyPr wrap="none" rtlCol="0">
+            <a:spAutoFit/>
+          </a:bodyPr>
+          <a:lstStyle/>
+          <a:p>
+            <a:r>
+              <a:rPr lang="en-US" dirty="0"/>
+              <a:t>SIDARTHE Bilayer</a:t>
+            </a:r>
+          </a:p>
+        </p:txBody>
+      </p:sp>
+      <p:sp>
+        <p:nvSpPr>
+          <p:cNvPr id="11" name="TextBox 10">
+            <a:extLst>
+              <a:ext uri="{FF2B5EF4-FFF2-40B4-BE49-F238E27FC236}">
+                <a16:creationId xmlns:a16="http://schemas.microsoft.com/office/drawing/2014/main" id="{38434195-E7D6-F701-98BC-F35B3A7196CA}"/>
+              </a:ext>
+            </a:extLst>
+          </p:cNvPr>
+          <p:cNvSpPr txBox="1"/>
+          <p:nvPr/>
+        </p:nvSpPr>
+        <p:spPr>
+          <a:xfrm>
+            <a:off x="7879926" y="1507070"/>
+            <a:ext cx="4046551" cy="2308324"/>
+          </a:xfrm>
+          <a:prstGeom prst="rect">
+            <a:avLst/>
+          </a:prstGeom>
+        </p:spPr>
+        <p:style>
+          <a:lnRef idx="1">
+            <a:schemeClr val="accent2"/>
+          </a:lnRef>
+          <a:fillRef idx="2">
+            <a:schemeClr val="accent2"/>
+          </a:fillRef>
+          <a:effectRef idx="1">
+            <a:schemeClr val="accent2"/>
+          </a:effectRef>
+          <a:fontRef idx="minor">
+            <a:schemeClr val="dk1"/>
+          </a:fontRef>
+        </p:style>
+        <p:txBody>
+          <a:bodyPr wrap="square">
+            <a:spAutoFit/>
+          </a:bodyPr>
+          <a:lstStyle/>
+          <a:p>
+            <a:r>
+              <a:rPr lang="en-US" sz="1800" dirty="0">
+                <a:effectLst/>
+                <a:latin typeface="Calibri" panose="020F0502020204030204" pitchFamily="34" charset="0"/>
+              </a:rPr>
+              <a:t>Constraints (for all steps):</a:t>
+            </a:r>
+          </a:p>
+          <a:p>
+            <a:pPr marL="285750" indent="-285750">
+              <a:buFont typeface="Arial" panose="020B0604020202020204" pitchFamily="34" charset="0"/>
+              <a:buChar char="•"/>
+            </a:pPr>
+            <a:r>
+              <a:rPr lang="en-US" sz="1800" dirty="0">
+                <a:effectLst/>
+                <a:latin typeface="CambriaMath"/>
+              </a:rPr>
+              <a:t>𝜃 </a:t>
+            </a:r>
+            <a:r>
+              <a:rPr lang="en-US" sz="1800" dirty="0">
+                <a:effectLst/>
+                <a:latin typeface="Calibri" panose="020F0502020204030204" pitchFamily="34" charset="0"/>
+              </a:rPr>
+              <a:t>&gt;= 2* </a:t>
+            </a:r>
+            <a:r>
+              <a:rPr lang="en-US" sz="1800" dirty="0">
+                <a:effectLst/>
+                <a:latin typeface="CambriaMath"/>
+              </a:rPr>
+              <a:t>𝜀</a:t>
+            </a:r>
+          </a:p>
+          <a:p>
+            <a:pPr marL="285750" indent="-285750">
+              <a:buFont typeface="Arial" panose="020B0604020202020204" pitchFamily="34" charset="0"/>
+              <a:buChar char="•"/>
+            </a:pPr>
+            <a:r>
+              <a:rPr lang="en-US" sz="1800" dirty="0">
+                <a:effectLst/>
+                <a:latin typeface="CambriaMath"/>
+              </a:rPr>
+              <a:t>𝜀 in [0.05, 0.2)</a:t>
+            </a:r>
+          </a:p>
+          <a:p>
+            <a:pPr marL="285750" indent="-285750">
+              <a:buFont typeface="Arial" panose="020B0604020202020204" pitchFamily="34" charset="0"/>
+              <a:buChar char="•"/>
+            </a:pPr>
+            <a:r>
+              <a:rPr lang="en-US" sz="1800" dirty="0">
+                <a:effectLst/>
+                <a:latin typeface="CambriaMath"/>
+              </a:rPr>
+              <a:t>𝜃 in [0.17, 0.4)</a:t>
+            </a:r>
+          </a:p>
+          <a:p>
+            <a:pPr marL="285750" indent="-285750">
+              <a:buFont typeface="Arial" panose="020B0604020202020204" pitchFamily="34" charset="0"/>
+              <a:buChar char="•"/>
+            </a:pPr>
+            <a:r>
+              <a:rPr lang="en-US" dirty="0">
+                <a:latin typeface="CambriaMath"/>
+              </a:rPr>
+              <a:t>Sum(SIDARTHE) in [0 – 1e-5, 1 + 1e-5) </a:t>
+            </a:r>
+          </a:p>
+          <a:p>
+            <a:pPr marL="285750" indent="-285750">
+              <a:buFont typeface="Arial" panose="020B0604020202020204" pitchFamily="34" charset="0"/>
+              <a:buChar char="•"/>
+            </a:pPr>
+            <a:r>
+              <a:rPr lang="en-US" dirty="0">
+                <a:latin typeface="CambriaMath"/>
+              </a:rPr>
+              <a:t>All variables non-negative</a:t>
+            </a:r>
+          </a:p>
+          <a:p>
+            <a:pPr marL="285750" indent="-285750">
+              <a:buFont typeface="Arial" panose="020B0604020202020204" pitchFamily="34" charset="0"/>
+              <a:buChar char="•"/>
+            </a:pPr>
+            <a:r>
+              <a:rPr lang="en-US" dirty="0">
+                <a:latin typeface="CambriaMath"/>
+              </a:rPr>
+              <a:t>Sum(IDART) &lt;= 0.33 (Query)</a:t>
+            </a:r>
+          </a:p>
+          <a:p>
+            <a:pPr marL="285750" indent="-285750">
+              <a:buFont typeface="Arial" panose="020B0604020202020204" pitchFamily="34" charset="0"/>
+              <a:buChar char="•"/>
+            </a:pPr>
+            <a:r>
+              <a:rPr lang="en-US" dirty="0">
+                <a:latin typeface="CambriaMath"/>
+              </a:rPr>
+              <a:t>Bilayer Dynamics + Parameters</a:t>
+            </a:r>
+          </a:p>
+        </p:txBody>
+      </p:sp>
+      <p:sp>
+        <p:nvSpPr>
+          <p:cNvPr id="12" name="TextBox 11">
+            <a:extLst>
+              <a:ext uri="{FF2B5EF4-FFF2-40B4-BE49-F238E27FC236}">
+                <a16:creationId xmlns:a16="http://schemas.microsoft.com/office/drawing/2014/main" id="{A014C22E-BC64-9DE2-D8C0-1FCFC3DE65AA}"/>
+              </a:ext>
+            </a:extLst>
+          </p:cNvPr>
+          <p:cNvSpPr txBox="1"/>
+          <p:nvPr/>
+        </p:nvSpPr>
+        <p:spPr>
+          <a:xfrm>
+            <a:off x="461618" y="4197816"/>
+            <a:ext cx="4859352" cy="2308324"/>
+          </a:xfrm>
+          <a:prstGeom prst="rect">
+            <a:avLst/>
+          </a:prstGeom>
+        </p:spPr>
+        <p:style>
+          <a:lnRef idx="1">
+            <a:schemeClr val="accent5"/>
+          </a:lnRef>
+          <a:fillRef idx="2">
+            <a:schemeClr val="accent5"/>
+          </a:fillRef>
+          <a:effectRef idx="1">
+            <a:schemeClr val="accent5"/>
+          </a:effectRef>
+          <a:fontRef idx="minor">
+            <a:schemeClr val="dk1"/>
+          </a:fontRef>
+        </p:style>
+        <p:txBody>
+          <a:bodyPr wrap="square">
+            <a:spAutoFit/>
+          </a:bodyPr>
+          <a:lstStyle/>
+          <a:p>
+            <a:r>
+              <a:rPr lang="en-US" sz="1800" dirty="0" err="1">
+                <a:effectLst/>
+                <a:latin typeface="Calibri" panose="020F0502020204030204" pitchFamily="34" charset="0"/>
+              </a:rPr>
+              <a:t>FunMAn</a:t>
+            </a:r>
+            <a:r>
+              <a:rPr lang="en-US" sz="1800" dirty="0">
+                <a:effectLst/>
+                <a:latin typeface="Calibri" panose="020F0502020204030204" pitchFamily="34" charset="0"/>
+              </a:rPr>
+              <a:t> proves that a box is either:</a:t>
+            </a:r>
+          </a:p>
+          <a:p>
+            <a:pPr marL="342900" indent="-342900">
+              <a:buFont typeface="Arial" panose="020B0604020202020204" pitchFamily="34" charset="0"/>
+              <a:buChar char="•"/>
+            </a:pPr>
+            <a:r>
+              <a:rPr lang="en-US" sz="1800" dirty="0">
+                <a:effectLst/>
+                <a:latin typeface="Calibri" panose="020F0502020204030204" pitchFamily="34" charset="0"/>
+              </a:rPr>
+              <a:t>“true” (contains no values violating query)</a:t>
+            </a:r>
+          </a:p>
+          <a:p>
+            <a:pPr marL="800100" lvl="1" indent="-342900">
+              <a:buFont typeface="Arial" panose="020B0604020202020204" pitchFamily="34" charset="0"/>
+              <a:buChar char="•"/>
+            </a:pPr>
+            <a:r>
+              <a:rPr lang="en-US" dirty="0">
+                <a:latin typeface="Calibri" panose="020F0502020204030204" pitchFamily="34" charset="0"/>
+              </a:rPr>
+              <a:t>Model and Not(Query) is </a:t>
+            </a:r>
+            <a:r>
+              <a:rPr lang="en-US" dirty="0" err="1">
+                <a:latin typeface="Calibri" panose="020F0502020204030204" pitchFamily="34" charset="0"/>
+              </a:rPr>
+              <a:t>unsat</a:t>
+            </a:r>
+            <a:endParaRPr lang="en-US" dirty="0">
+              <a:effectLst/>
+              <a:latin typeface="Calibri" panose="020F0502020204030204" pitchFamily="34" charset="0"/>
+            </a:endParaRPr>
+          </a:p>
+          <a:p>
+            <a:pPr marL="342900" indent="-342900">
+              <a:buFont typeface="Arial" panose="020B0604020202020204" pitchFamily="34" charset="0"/>
+              <a:buChar char="•"/>
+            </a:pPr>
+            <a:r>
+              <a:rPr lang="en-US" dirty="0">
+                <a:latin typeface="Calibri" panose="020F0502020204030204" pitchFamily="34" charset="0"/>
+              </a:rPr>
+              <a:t>“false” (contains no values satisfying query)</a:t>
+            </a:r>
+            <a:r>
+              <a:rPr lang="en-US" sz="1800" dirty="0">
+                <a:effectLst/>
+                <a:latin typeface="Calibri" panose="020F0502020204030204" pitchFamily="34" charset="0"/>
+              </a:rPr>
+              <a:t> </a:t>
+            </a:r>
+          </a:p>
+          <a:p>
+            <a:pPr marL="800100" lvl="1" indent="-342900">
+              <a:buFont typeface="Arial" panose="020B0604020202020204" pitchFamily="34" charset="0"/>
+              <a:buChar char="•"/>
+            </a:pPr>
+            <a:r>
+              <a:rPr lang="en-US" dirty="0">
+                <a:latin typeface="Calibri" panose="020F0502020204030204" pitchFamily="34" charset="0"/>
+              </a:rPr>
+              <a:t>Model and Query is </a:t>
+            </a:r>
+            <a:r>
+              <a:rPr lang="en-US" dirty="0" err="1">
+                <a:latin typeface="Calibri" panose="020F0502020204030204" pitchFamily="34" charset="0"/>
+              </a:rPr>
+              <a:t>unsat</a:t>
+            </a:r>
+            <a:endParaRPr lang="en-US" dirty="0">
+              <a:effectLst/>
+              <a:latin typeface="Calibri" panose="020F0502020204030204" pitchFamily="34" charset="0"/>
+            </a:endParaRPr>
+          </a:p>
+          <a:p>
+            <a:r>
+              <a:rPr lang="en-US" dirty="0" err="1">
+                <a:latin typeface="Calibri" panose="020F0502020204030204" pitchFamily="34" charset="0"/>
+              </a:rPr>
+              <a:t>FunMAn</a:t>
+            </a:r>
+            <a:r>
+              <a:rPr lang="en-US" dirty="0">
+                <a:latin typeface="Calibri" panose="020F0502020204030204" pitchFamily="34" charset="0"/>
+              </a:rPr>
+              <a:t> splits boxes until:</a:t>
+            </a:r>
+          </a:p>
+          <a:p>
+            <a:pPr marL="285750" indent="-285750">
+              <a:buFont typeface="Arial" panose="020B0604020202020204" pitchFamily="34" charset="0"/>
+              <a:buChar char="•"/>
+            </a:pPr>
+            <a:r>
+              <a:rPr lang="en-US" dirty="0">
+                <a:latin typeface="Calibri" panose="020F0502020204030204" pitchFamily="34" charset="0"/>
+              </a:rPr>
+              <a:t>Each box is proven true or false</a:t>
+            </a:r>
+          </a:p>
+          <a:p>
+            <a:pPr marL="285750" indent="-285750">
+              <a:buFont typeface="Arial" panose="020B0604020202020204" pitchFamily="34" charset="0"/>
+              <a:buChar char="•"/>
+            </a:pPr>
+            <a:r>
+              <a:rPr lang="en-US" dirty="0">
+                <a:latin typeface="CambriaMath"/>
+              </a:rPr>
+              <a:t>Remaining box widths fall below threshold</a:t>
+            </a:r>
+          </a:p>
+        </p:txBody>
+      </p:sp>
+      <p:cxnSp>
+        <p:nvCxnSpPr>
+          <p:cNvPr id="14" name="Straight Arrow Connector 13">
+            <a:extLst>
+              <a:ext uri="{FF2B5EF4-FFF2-40B4-BE49-F238E27FC236}">
+                <a16:creationId xmlns:a16="http://schemas.microsoft.com/office/drawing/2014/main" id="{73199711-0DE9-EE6F-5550-B5E1561D287F}"/>
+              </a:ext>
+            </a:extLst>
+          </p:cNvPr>
+          <p:cNvCxnSpPr>
+            <a:cxnSpLocks/>
+            <a:stCxn id="7" idx="2"/>
+            <a:endCxn id="11" idx="1"/>
+          </p:cNvCxnSpPr>
+          <p:nvPr/>
+        </p:nvCxnSpPr>
+        <p:spPr>
+          <a:xfrm rot="16200000" flipH="1">
+            <a:off x="5678016" y="459321"/>
+            <a:ext cx="614069" cy="3789752"/>
+          </a:xfrm>
+          <a:prstGeom prst="bentConnector2">
+            <a:avLst/>
+          </a:prstGeom>
+          <a:ln>
+            <a:tailEnd type="triangle"/>
+          </a:ln>
+        </p:spPr>
+        <p:style>
+          <a:lnRef idx="1">
+            <a:schemeClr val="accent1"/>
+          </a:lnRef>
+          <a:fillRef idx="0">
+            <a:schemeClr val="accent1"/>
+          </a:fillRef>
+          <a:effectRef idx="0">
+            <a:schemeClr val="accent1"/>
+          </a:effectRef>
+          <a:fontRef idx="minor">
+            <a:schemeClr val="tx1"/>
+          </a:fontRef>
+        </p:style>
+      </p:cxnSp>
+      <p:cxnSp>
+        <p:nvCxnSpPr>
+          <p:cNvPr id="15" name="Straight Arrow Connector 14">
+            <a:extLst>
+              <a:ext uri="{FF2B5EF4-FFF2-40B4-BE49-F238E27FC236}">
+                <a16:creationId xmlns:a16="http://schemas.microsoft.com/office/drawing/2014/main" id="{3B882956-352D-AF5F-FB53-79F7864169B1}"/>
+              </a:ext>
+            </a:extLst>
+          </p:cNvPr>
+          <p:cNvCxnSpPr>
+            <a:cxnSpLocks/>
+            <a:stCxn id="8" idx="3"/>
+            <a:endCxn id="11" idx="1"/>
+          </p:cNvCxnSpPr>
+          <p:nvPr/>
+        </p:nvCxnSpPr>
+        <p:spPr>
+          <a:xfrm flipV="1">
+            <a:off x="6278879" y="2661232"/>
+            <a:ext cx="1601047" cy="657456"/>
+          </a:xfrm>
+          <a:prstGeom prst="bentConnector3">
+            <a:avLst>
+              <a:gd name="adj1" fmla="val 50000"/>
+            </a:avLst>
+          </a:prstGeom>
+          <a:ln>
+            <a:tailEnd type="triangle"/>
+          </a:ln>
+        </p:spPr>
+        <p:style>
+          <a:lnRef idx="1">
+            <a:schemeClr val="accent1"/>
+          </a:lnRef>
+          <a:fillRef idx="0">
+            <a:schemeClr val="accent1"/>
+          </a:fillRef>
+          <a:effectRef idx="0">
+            <a:schemeClr val="accent1"/>
+          </a:effectRef>
+          <a:fontRef idx="minor">
+            <a:schemeClr val="tx1"/>
+          </a:fontRef>
+        </p:style>
+      </p:cxnSp>
+      <p:cxnSp>
+        <p:nvCxnSpPr>
+          <p:cNvPr id="18" name="Straight Arrow Connector 17">
+            <a:extLst>
+              <a:ext uri="{FF2B5EF4-FFF2-40B4-BE49-F238E27FC236}">
+                <a16:creationId xmlns:a16="http://schemas.microsoft.com/office/drawing/2014/main" id="{50114EC3-11A7-280C-FF1C-A937F0C1D6BB}"/>
+              </a:ext>
+            </a:extLst>
+          </p:cNvPr>
+          <p:cNvCxnSpPr>
+            <a:cxnSpLocks/>
+            <a:stCxn id="11" idx="2"/>
+            <a:endCxn id="12" idx="0"/>
+          </p:cNvCxnSpPr>
+          <p:nvPr/>
+        </p:nvCxnSpPr>
+        <p:spPr>
+          <a:xfrm rot="5400000">
+            <a:off x="6206037" y="500651"/>
+            <a:ext cx="382422" cy="7011908"/>
+          </a:xfrm>
+          <a:prstGeom prst="bentConnector3">
+            <a:avLst>
+              <a:gd name="adj1" fmla="val 50000"/>
+            </a:avLst>
+          </a:prstGeom>
+          <a:ln>
+            <a:tailEnd type="triangle"/>
+          </a:ln>
+        </p:spPr>
+        <p:style>
+          <a:lnRef idx="1">
+            <a:schemeClr val="accent1"/>
+          </a:lnRef>
+          <a:fillRef idx="0">
+            <a:schemeClr val="accent1"/>
+          </a:fillRef>
+          <a:effectRef idx="0">
+            <a:schemeClr val="accent1"/>
+          </a:effectRef>
+          <a:fontRef idx="minor">
+            <a:schemeClr val="tx1"/>
+          </a:fontRef>
+        </p:style>
+      </p:cxnSp>
+      <p:cxnSp>
+        <p:nvCxnSpPr>
+          <p:cNvPr id="24" name="Straight Arrow Connector 17">
+            <a:extLst>
+              <a:ext uri="{FF2B5EF4-FFF2-40B4-BE49-F238E27FC236}">
+                <a16:creationId xmlns:a16="http://schemas.microsoft.com/office/drawing/2014/main" id="{7396D436-EA77-BE86-78A8-EA304711F9F7}"/>
+              </a:ext>
+            </a:extLst>
+          </p:cNvPr>
+          <p:cNvCxnSpPr>
+            <a:cxnSpLocks/>
+            <a:stCxn id="12" idx="3"/>
+          </p:cNvCxnSpPr>
+          <p:nvPr/>
+        </p:nvCxnSpPr>
+        <p:spPr>
+          <a:xfrm>
+            <a:off x="5320970" y="5351978"/>
+            <a:ext cx="1179594" cy="1"/>
+          </a:xfrm>
+          <a:prstGeom prst="bentConnector3">
+            <a:avLst>
+              <a:gd name="adj1" fmla="val 50000"/>
+            </a:avLst>
+          </a:prstGeom>
+          <a:ln>
+            <a:tailEnd type="triangle"/>
+          </a:ln>
+        </p:spPr>
+        <p:style>
+          <a:lnRef idx="1">
+            <a:schemeClr val="accent1"/>
+          </a:lnRef>
+          <a:fillRef idx="0">
+            <a:schemeClr val="accent1"/>
+          </a:fillRef>
+          <a:effectRef idx="0">
+            <a:schemeClr val="accent1"/>
+          </a:effectRef>
+          <a:fontRef idx="minor">
+            <a:schemeClr val="tx1"/>
+          </a:fontRef>
+        </p:style>
+      </p:cxnSp>
+      <p:sp>
+        <p:nvSpPr>
+          <p:cNvPr id="28" name="Oval 27">
+            <a:extLst>
+              <a:ext uri="{FF2B5EF4-FFF2-40B4-BE49-F238E27FC236}">
+                <a16:creationId xmlns:a16="http://schemas.microsoft.com/office/drawing/2014/main" id="{DF3A1F2E-0913-E767-BB49-24242927C7B9}"/>
+              </a:ext>
+            </a:extLst>
+          </p:cNvPr>
+          <p:cNvSpPr/>
+          <p:nvPr/>
+        </p:nvSpPr>
+        <p:spPr>
+          <a:xfrm>
+            <a:off x="7804632" y="5244054"/>
+            <a:ext cx="436846" cy="358063"/>
+          </a:xfrm>
+          <a:prstGeom prst="ellipse">
+            <a:avLst/>
+          </a:prstGeom>
+          <a:noFill/>
+          <a:ln w="28575">
+            <a:solidFill>
+              <a:srgbClr val="FF0000"/>
+            </a:solidFill>
+          </a:ln>
+        </p:spPr>
+        <p:style>
+          <a:lnRef idx="2">
+            <a:schemeClr val="accent1">
+              <a:shade val="50000"/>
+            </a:schemeClr>
+          </a:lnRef>
+          <a:fillRef idx="1">
+            <a:schemeClr val="accent1"/>
+          </a:fillRef>
+          <a:effectRef idx="0">
+            <a:schemeClr val="accent1"/>
+          </a:effectRef>
+          <a:fontRef idx="minor">
+            <a:schemeClr val="lt1"/>
+          </a:fontRef>
+        </p:style>
+        <p:txBody>
+          <a:bodyPr rtlCol="0" anchor="ctr"/>
+          <a:lstStyle/>
+          <a:p>
+            <a:pPr algn="ctr"/>
+            <a:endParaRPr lang="en-US"/>
+          </a:p>
+        </p:txBody>
+      </p:sp>
+      <p:sp>
+        <p:nvSpPr>
+          <p:cNvPr id="29" name="TextBox 28">
+            <a:extLst>
+              <a:ext uri="{FF2B5EF4-FFF2-40B4-BE49-F238E27FC236}">
+                <a16:creationId xmlns:a16="http://schemas.microsoft.com/office/drawing/2014/main" id="{0B23FA56-BC6E-96B3-941A-0A3FC6063701}"/>
+              </a:ext>
+            </a:extLst>
+          </p:cNvPr>
+          <p:cNvSpPr txBox="1"/>
+          <p:nvPr/>
+        </p:nvSpPr>
+        <p:spPr>
+          <a:xfrm>
+            <a:off x="9903201" y="4245316"/>
+            <a:ext cx="2089121" cy="2031325"/>
+          </a:xfrm>
+          <a:prstGeom prst="rect">
+            <a:avLst/>
+          </a:prstGeom>
+        </p:spPr>
+        <p:style>
+          <a:lnRef idx="1">
+            <a:schemeClr val="accent5"/>
+          </a:lnRef>
+          <a:fillRef idx="2">
+            <a:schemeClr val="accent5"/>
+          </a:fillRef>
+          <a:effectRef idx="1">
+            <a:schemeClr val="accent5"/>
+          </a:effectRef>
+          <a:fontRef idx="minor">
+            <a:schemeClr val="dk1"/>
+          </a:fontRef>
+        </p:style>
+        <p:txBody>
+          <a:bodyPr wrap="square">
+            <a:spAutoFit/>
+          </a:bodyPr>
+          <a:lstStyle/>
+          <a:p>
+            <a:r>
+              <a:rPr lang="en-US" sz="1800" dirty="0">
+                <a:effectLst/>
+                <a:latin typeface="Calibri" panose="020F0502020204030204" pitchFamily="34" charset="0"/>
+              </a:rPr>
+              <a:t>Min Values are in</a:t>
+            </a:r>
+          </a:p>
+          <a:p>
+            <a:r>
+              <a:rPr lang="en-US" dirty="0">
+                <a:latin typeface="Calibri" panose="020F0502020204030204" pitchFamily="34" charset="0"/>
+              </a:rPr>
+              <a:t>Indeterminate region (white).  Example point: (0.125, 0.239)</a:t>
+            </a:r>
+          </a:p>
+          <a:p>
+            <a:r>
+              <a:rPr lang="en-US" dirty="0">
+                <a:latin typeface="Calibri" panose="020F0502020204030204" pitchFamily="34" charset="0"/>
+              </a:rPr>
+              <a:t>Original values:</a:t>
+            </a:r>
+          </a:p>
+          <a:p>
+            <a:r>
+              <a:rPr lang="en-US" dirty="0">
+                <a:latin typeface="Calibri" panose="020F0502020204030204" pitchFamily="34" charset="0"/>
+              </a:rPr>
+              <a:t>(0.171, 0.371)</a:t>
+            </a:r>
+            <a:endParaRPr lang="en-US" dirty="0">
+              <a:latin typeface="CambriaMath"/>
+            </a:endParaRPr>
+          </a:p>
+        </p:txBody>
+      </p:sp>
+      <p:cxnSp>
+        <p:nvCxnSpPr>
+          <p:cNvPr id="30" name="Straight Arrow Connector 17">
+            <a:extLst>
+              <a:ext uri="{FF2B5EF4-FFF2-40B4-BE49-F238E27FC236}">
+                <a16:creationId xmlns:a16="http://schemas.microsoft.com/office/drawing/2014/main" id="{44E70972-1536-1CC6-B9DA-AF75C8BA0300}"/>
+              </a:ext>
+            </a:extLst>
+          </p:cNvPr>
+          <p:cNvCxnSpPr>
+            <a:cxnSpLocks/>
+            <a:stCxn id="29" idx="1"/>
+            <a:endCxn id="28" idx="6"/>
+          </p:cNvCxnSpPr>
+          <p:nvPr/>
+        </p:nvCxnSpPr>
+        <p:spPr>
+          <a:xfrm flipH="1">
+            <a:off x="8241478" y="5260979"/>
+            <a:ext cx="1661723" cy="162107"/>
+          </a:xfrm>
+          <a:prstGeom prst="straightConnector1">
+            <a:avLst/>
+          </a:prstGeom>
+          <a:ln>
+            <a:tailEnd type="triangle"/>
+          </a:ln>
+        </p:spPr>
+        <p:style>
+          <a:lnRef idx="1">
+            <a:schemeClr val="accent1"/>
+          </a:lnRef>
+          <a:fillRef idx="0">
+            <a:schemeClr val="accent1"/>
+          </a:fillRef>
+          <a:effectRef idx="0">
+            <a:schemeClr val="accent1"/>
+          </a:effectRef>
+          <a:fontRef idx="minor">
+            <a:schemeClr val="tx1"/>
+          </a:fontRef>
+        </p:style>
+      </p:cxnSp>
+    </p:spTree>
+    <p:extLst>
+      <p:ext uri="{BB962C8B-B14F-4D97-AF65-F5344CB8AC3E}">
+        <p14:creationId xmlns:p14="http://schemas.microsoft.com/office/powerpoint/2010/main" val="4173372802"/>
+      </p:ext>
+    </p:extLst>
+  </p:cSld>
+  <p:clrMapOvr>
+    <a:masterClrMapping/>
+  </p:clrMapOvr>
+</p:sld>
+</file>
+
 <file path=ppt/theme/theme1.xml><?xml version="1.0" encoding="utf-8"?>
 <a:theme xmlns:a="http://schemas.openxmlformats.org/drawingml/2006/main" name="Office Theme">
   <a:themeElements>

</xml_diff>